<commit_message>
GDC 2010 revised version
</commit_message>
<xml_diff>
--- a/05_DependencyGraph/05_DependencyGraph.pptx
+++ b/05_DependencyGraph/05_DependencyGraph.pptx
@@ -896,37 +896,22 @@
       </p:sp>
       <p:sp>
         <p:nvSpPr>
-          <p:cNvPr id="606211" name="Rectangle 3"/>
-          <p:cNvSpPr>
-            <a:spLocks noGrp="1" noChangeArrowheads="1"/>
+          <p:cNvPr id="5" name="Notes Placeholder 4"/>
+          <p:cNvSpPr>
+            <a:spLocks noGrp="1"/>
           </p:cNvSpPr>
           <p:nvPr>
-            <p:ph type="body" idx="1"/>
+            <p:ph type="body" sz="quarter" idx="10"/>
           </p:nvPr>
         </p:nvSpPr>
         <p:spPr/>
         <p:txBody>
-          <a:bodyPr/>
-          <a:lstStyle/>
-          <a:p>
-            <a:pPr marL="0" marR="0" indent="0" algn="l" defTabSz="914400" rtl="0" eaLnBrk="1" fontAlgn="base" latinLnBrk="0" hangingPunct="1">
-              <a:lnSpc>
-                <a:spcPct val="100000"/>
-              </a:lnSpc>
-              <a:spcBef>
-                <a:spcPct val="30000"/>
-              </a:spcBef>
-              <a:spcAft>
-                <a:spcPct val="0"/>
-              </a:spcAft>
-              <a:buClrTx/>
-              <a:buSzTx/>
-              <a:buFontTx/>
-              <a:buNone/>
-              <a:tabLst/>
-              <a:defRPr/>
-            </a:pPr>
-            <a:endParaRPr lang="en-US" dirty="0"/>
+          <a:bodyPr>
+            <a:normAutofit/>
+          </a:bodyPr>
+          <a:lstStyle/>
+          <a:p>
+            <a:endParaRPr lang="en-US"/>
           </a:p>
         </p:txBody>
       </p:sp>
@@ -974,27 +959,6 @@
       </p:sp>
       <p:sp>
         <p:nvSpPr>
-          <p:cNvPr id="3" name="Notes Placeholder 2"/>
-          <p:cNvSpPr>
-            <a:spLocks noGrp="1"/>
-          </p:cNvSpPr>
-          <p:nvPr>
-            <p:ph type="body" idx="1"/>
-          </p:nvPr>
-        </p:nvSpPr>
-        <p:spPr/>
-        <p:txBody>
-          <a:bodyPr>
-            <a:normAutofit/>
-          </a:bodyPr>
-          <a:lstStyle/>
-          <a:p>
-            <a:endParaRPr lang="en-US" dirty="0"/>
-          </a:p>
-        </p:txBody>
-      </p:sp>
-      <p:sp>
-        <p:nvSpPr>
           <p:cNvPr id="4" name="Slide Number Placeholder 3"/>
           <p:cNvSpPr>
             <a:spLocks noGrp="1"/>
@@ -1013,6 +977,27 @@
               <a:pPr/>
               <a:t>10</a:t>
             </a:fld>
+            <a:endParaRPr lang="en-US"/>
+          </a:p>
+        </p:txBody>
+      </p:sp>
+      <p:sp>
+        <p:nvSpPr>
+          <p:cNvPr id="5" name="Notes Placeholder 4"/>
+          <p:cNvSpPr>
+            <a:spLocks noGrp="1"/>
+          </p:cNvSpPr>
+          <p:nvPr>
+            <p:ph type="body" sz="quarter" idx="11"/>
+          </p:nvPr>
+        </p:nvSpPr>
+        <p:spPr/>
+        <p:txBody>
+          <a:bodyPr>
+            <a:normAutofit/>
+          </a:bodyPr>
+          <a:lstStyle/>
+          <a:p>
             <a:endParaRPr lang="en-US"/>
           </a:p>
         </p:txBody>
@@ -1149,30 +1134,6 @@
       </p:sp>
       <p:sp>
         <p:nvSpPr>
-          <p:cNvPr id="89091" name="Notes Placeholder 2"/>
-          <p:cNvSpPr>
-            <a:spLocks noGrp="1"/>
-          </p:cNvSpPr>
-          <p:nvPr>
-            <p:ph type="body" idx="1"/>
-          </p:nvPr>
-        </p:nvSpPr>
-        <p:spPr>
-          <a:noFill/>
-          <a:ln/>
-        </p:spPr>
-        <p:txBody>
-          <a:bodyPr/>
-          <a:lstStyle/>
-          <a:p>
-            <a:endParaRPr lang="en-US" dirty="0" smtClean="0">
-              <a:latin typeface="Arial" charset="0"/>
-            </a:endParaRPr>
-          </a:p>
-        </p:txBody>
-      </p:sp>
-      <p:sp>
-        <p:nvSpPr>
           <p:cNvPr id="89092" name="Slide Number Placeholder 3"/>
           <p:cNvSpPr>
             <a:spLocks noGrp="1"/>
@@ -1223,6 +1184,27 @@
               <a:ea typeface="+mn-ea"/>
               <a:cs typeface="+mn-cs"/>
             </a:endParaRPr>
+          </a:p>
+        </p:txBody>
+      </p:sp>
+      <p:sp>
+        <p:nvSpPr>
+          <p:cNvPr id="5" name="Notes Placeholder 4"/>
+          <p:cNvSpPr>
+            <a:spLocks noGrp="1"/>
+          </p:cNvSpPr>
+          <p:nvPr>
+            <p:ph type="body" sz="quarter" idx="10"/>
+          </p:nvPr>
+        </p:nvSpPr>
+        <p:spPr/>
+        <p:txBody>
+          <a:bodyPr>
+            <a:normAutofit/>
+          </a:bodyPr>
+          <a:lstStyle/>
+          <a:p>
+            <a:endParaRPr lang="en-US"/>
           </a:p>
         </p:txBody>
       </p:sp>
@@ -1270,27 +1252,6 @@
       </p:sp>
       <p:sp>
         <p:nvSpPr>
-          <p:cNvPr id="3" name="Notes Placeholder 2"/>
-          <p:cNvSpPr>
-            <a:spLocks noGrp="1"/>
-          </p:cNvSpPr>
-          <p:nvPr>
-            <p:ph type="body" idx="1"/>
-          </p:nvPr>
-        </p:nvSpPr>
-        <p:spPr/>
-        <p:txBody>
-          <a:bodyPr>
-            <a:normAutofit/>
-          </a:bodyPr>
-          <a:lstStyle/>
-          <a:p>
-            <a:endParaRPr lang="en-US" dirty="0"/>
-          </a:p>
-        </p:txBody>
-      </p:sp>
-      <p:sp>
-        <p:nvSpPr>
           <p:cNvPr id="4" name="Slide Number Placeholder 3"/>
           <p:cNvSpPr>
             <a:spLocks noGrp="1"/>
@@ -1309,6 +1270,27 @@
               <a:pPr/>
               <a:t>13</a:t>
             </a:fld>
+            <a:endParaRPr lang="en-US"/>
+          </a:p>
+        </p:txBody>
+      </p:sp>
+      <p:sp>
+        <p:nvSpPr>
+          <p:cNvPr id="5" name="Notes Placeholder 4"/>
+          <p:cNvSpPr>
+            <a:spLocks noGrp="1"/>
+          </p:cNvSpPr>
+          <p:nvPr>
+            <p:ph type="body" sz="quarter" idx="11"/>
+          </p:nvPr>
+        </p:nvSpPr>
+        <p:spPr/>
+        <p:txBody>
+          <a:bodyPr>
+            <a:normAutofit/>
+          </a:bodyPr>
+          <a:lstStyle/>
+          <a:p>
             <a:endParaRPr lang="en-US"/>
           </a:p>
         </p:txBody>
@@ -1358,30 +1340,6 @@
       </p:sp>
       <p:sp>
         <p:nvSpPr>
-          <p:cNvPr id="90115" name="Notes Placeholder 2"/>
-          <p:cNvSpPr>
-            <a:spLocks noGrp="1"/>
-          </p:cNvSpPr>
-          <p:nvPr>
-            <p:ph type="body" idx="1"/>
-          </p:nvPr>
-        </p:nvSpPr>
-        <p:spPr>
-          <a:noFill/>
-          <a:ln/>
-        </p:spPr>
-        <p:txBody>
-          <a:bodyPr/>
-          <a:lstStyle/>
-          <a:p>
-            <a:endParaRPr lang="en-US" dirty="0" smtClean="0">
-              <a:latin typeface="Arial" charset="0"/>
-            </a:endParaRPr>
-          </a:p>
-        </p:txBody>
-      </p:sp>
-      <p:sp>
-        <p:nvSpPr>
           <p:cNvPr id="90116" name="Slide Number Placeholder 3"/>
           <p:cNvSpPr>
             <a:spLocks noGrp="1"/>
@@ -1432,6 +1390,27 @@
               <a:ea typeface="+mn-ea"/>
               <a:cs typeface="+mn-cs"/>
             </a:endParaRPr>
+          </a:p>
+        </p:txBody>
+      </p:sp>
+      <p:sp>
+        <p:nvSpPr>
+          <p:cNvPr id="5" name="Notes Placeholder 4"/>
+          <p:cNvSpPr>
+            <a:spLocks noGrp="1"/>
+          </p:cNvSpPr>
+          <p:nvPr>
+            <p:ph type="body" sz="quarter" idx="10"/>
+          </p:nvPr>
+        </p:nvSpPr>
+        <p:spPr/>
+        <p:txBody>
+          <a:bodyPr>
+            <a:normAutofit/>
+          </a:bodyPr>
+          <a:lstStyle/>
+          <a:p>
+            <a:endParaRPr lang="en-US"/>
           </a:p>
         </p:txBody>
       </p:sp>
@@ -1566,27 +1545,6 @@
       </p:sp>
       <p:sp>
         <p:nvSpPr>
-          <p:cNvPr id="3" name="Notes Placeholder 2"/>
-          <p:cNvSpPr>
-            <a:spLocks noGrp="1"/>
-          </p:cNvSpPr>
-          <p:nvPr>
-            <p:ph type="body" idx="1"/>
-          </p:nvPr>
-        </p:nvSpPr>
-        <p:spPr/>
-        <p:txBody>
-          <a:bodyPr>
-            <a:normAutofit/>
-          </a:bodyPr>
-          <a:lstStyle/>
-          <a:p>
-            <a:endParaRPr lang="en-US" dirty="0"/>
-          </a:p>
-        </p:txBody>
-      </p:sp>
-      <p:sp>
-        <p:nvSpPr>
           <p:cNvPr id="4" name="Slide Number Placeholder 3"/>
           <p:cNvSpPr>
             <a:spLocks noGrp="1"/>
@@ -1605,6 +1563,27 @@
               <a:pPr/>
               <a:t>16</a:t>
             </a:fld>
+            <a:endParaRPr lang="en-US"/>
+          </a:p>
+        </p:txBody>
+      </p:sp>
+      <p:sp>
+        <p:nvSpPr>
+          <p:cNvPr id="5" name="Notes Placeholder 4"/>
+          <p:cNvSpPr>
+            <a:spLocks noGrp="1"/>
+          </p:cNvSpPr>
+          <p:nvPr>
+            <p:ph type="body" sz="quarter" idx="11"/>
+          </p:nvPr>
+        </p:nvSpPr>
+        <p:spPr/>
+        <p:txBody>
+          <a:bodyPr>
+            <a:normAutofit/>
+          </a:bodyPr>
+          <a:lstStyle/>
+          <a:p>
             <a:endParaRPr lang="en-US"/>
           </a:p>
         </p:txBody>
@@ -1653,27 +1632,6 @@
       </p:sp>
       <p:sp>
         <p:nvSpPr>
-          <p:cNvPr id="3" name="Notes Placeholder 2"/>
-          <p:cNvSpPr>
-            <a:spLocks noGrp="1"/>
-          </p:cNvSpPr>
-          <p:nvPr>
-            <p:ph type="body" idx="1"/>
-          </p:nvPr>
-        </p:nvSpPr>
-        <p:spPr/>
-        <p:txBody>
-          <a:bodyPr>
-            <a:normAutofit/>
-          </a:bodyPr>
-          <a:lstStyle/>
-          <a:p>
-            <a:endParaRPr lang="en-US" dirty="0"/>
-          </a:p>
-        </p:txBody>
-      </p:sp>
-      <p:sp>
-        <p:nvSpPr>
           <p:cNvPr id="4" name="Slide Number Placeholder 3"/>
           <p:cNvSpPr>
             <a:spLocks noGrp="1"/>
@@ -1692,6 +1650,27 @@
               <a:pPr/>
               <a:t>17</a:t>
             </a:fld>
+            <a:endParaRPr lang="en-US"/>
+          </a:p>
+        </p:txBody>
+      </p:sp>
+      <p:sp>
+        <p:nvSpPr>
+          <p:cNvPr id="5" name="Notes Placeholder 4"/>
+          <p:cNvSpPr>
+            <a:spLocks noGrp="1"/>
+          </p:cNvSpPr>
+          <p:nvPr>
+            <p:ph type="body" sz="quarter" idx="11"/>
+          </p:nvPr>
+        </p:nvSpPr>
+        <p:spPr/>
+        <p:txBody>
+          <a:bodyPr>
+            <a:normAutofit/>
+          </a:bodyPr>
+          <a:lstStyle/>
+          <a:p>
             <a:endParaRPr lang="en-US"/>
           </a:p>
         </p:txBody>
@@ -1949,27 +1928,6 @@
       </p:sp>
       <p:sp>
         <p:nvSpPr>
-          <p:cNvPr id="3" name="Notes Placeholder 2"/>
-          <p:cNvSpPr>
-            <a:spLocks noGrp="1"/>
-          </p:cNvSpPr>
-          <p:nvPr>
-            <p:ph type="body" idx="1"/>
-          </p:nvPr>
-        </p:nvSpPr>
-        <p:spPr/>
-        <p:txBody>
-          <a:bodyPr>
-            <a:normAutofit/>
-          </a:bodyPr>
-          <a:lstStyle/>
-          <a:p>
-            <a:endParaRPr lang="en-US" dirty="0"/>
-          </a:p>
-        </p:txBody>
-      </p:sp>
-      <p:sp>
-        <p:nvSpPr>
           <p:cNvPr id="4" name="Slide Number Placeholder 3"/>
           <p:cNvSpPr>
             <a:spLocks noGrp="1"/>
@@ -1988,6 +1946,27 @@
               <a:pPr/>
               <a:t>2</a:t>
             </a:fld>
+            <a:endParaRPr lang="en-US"/>
+          </a:p>
+        </p:txBody>
+      </p:sp>
+      <p:sp>
+        <p:nvSpPr>
+          <p:cNvPr id="5" name="Notes Placeholder 4"/>
+          <p:cNvSpPr>
+            <a:spLocks noGrp="1"/>
+          </p:cNvSpPr>
+          <p:nvPr>
+            <p:ph type="body" sz="quarter" idx="11"/>
+          </p:nvPr>
+        </p:nvSpPr>
+        <p:spPr/>
+        <p:txBody>
+          <a:bodyPr>
+            <a:normAutofit/>
+          </a:bodyPr>
+          <a:lstStyle/>
+          <a:p>
             <a:endParaRPr lang="en-US"/>
           </a:p>
         </p:txBody>
@@ -2036,27 +2015,6 @@
       </p:sp>
       <p:sp>
         <p:nvSpPr>
-          <p:cNvPr id="3" name="Notes Placeholder 2"/>
-          <p:cNvSpPr>
-            <a:spLocks noGrp="1"/>
-          </p:cNvSpPr>
-          <p:nvPr>
-            <p:ph type="body" idx="1"/>
-          </p:nvPr>
-        </p:nvSpPr>
-        <p:spPr/>
-        <p:txBody>
-          <a:bodyPr>
-            <a:normAutofit/>
-          </a:bodyPr>
-          <a:lstStyle/>
-          <a:p>
-            <a:endParaRPr lang="en-US" dirty="0"/>
-          </a:p>
-        </p:txBody>
-      </p:sp>
-      <p:sp>
-        <p:nvSpPr>
           <p:cNvPr id="4" name="Slide Number Placeholder 3"/>
           <p:cNvSpPr>
             <a:spLocks noGrp="1"/>
@@ -2075,6 +2033,27 @@
               <a:pPr/>
               <a:t>20</a:t>
             </a:fld>
+            <a:endParaRPr lang="en-US"/>
+          </a:p>
+        </p:txBody>
+      </p:sp>
+      <p:sp>
+        <p:nvSpPr>
+          <p:cNvPr id="5" name="Notes Placeholder 4"/>
+          <p:cNvSpPr>
+            <a:spLocks noGrp="1"/>
+          </p:cNvSpPr>
+          <p:nvPr>
+            <p:ph type="body" sz="quarter" idx="11"/>
+          </p:nvPr>
+        </p:nvSpPr>
+        <p:spPr/>
+        <p:txBody>
+          <a:bodyPr>
+            <a:normAutofit/>
+          </a:bodyPr>
+          <a:lstStyle/>
+          <a:p>
             <a:endParaRPr lang="en-US"/>
           </a:p>
         </p:txBody>
@@ -2123,27 +2102,6 @@
       </p:sp>
       <p:sp>
         <p:nvSpPr>
-          <p:cNvPr id="3" name="Notes Placeholder 2"/>
-          <p:cNvSpPr>
-            <a:spLocks noGrp="1"/>
-          </p:cNvSpPr>
-          <p:nvPr>
-            <p:ph type="body" idx="1"/>
-          </p:nvPr>
-        </p:nvSpPr>
-        <p:spPr/>
-        <p:txBody>
-          <a:bodyPr>
-            <a:normAutofit/>
-          </a:bodyPr>
-          <a:lstStyle/>
-          <a:p>
-            <a:endParaRPr lang="en-US" dirty="0"/>
-          </a:p>
-        </p:txBody>
-      </p:sp>
-      <p:sp>
-        <p:nvSpPr>
           <p:cNvPr id="4" name="Slide Number Placeholder 3"/>
           <p:cNvSpPr>
             <a:spLocks noGrp="1"/>
@@ -2162,6 +2120,27 @@
               <a:pPr/>
               <a:t>21</a:t>
             </a:fld>
+            <a:endParaRPr lang="en-US"/>
+          </a:p>
+        </p:txBody>
+      </p:sp>
+      <p:sp>
+        <p:nvSpPr>
+          <p:cNvPr id="5" name="Notes Placeholder 4"/>
+          <p:cNvSpPr>
+            <a:spLocks noGrp="1"/>
+          </p:cNvSpPr>
+          <p:nvPr>
+            <p:ph type="body" sz="quarter" idx="11"/>
+          </p:nvPr>
+        </p:nvSpPr>
+        <p:spPr/>
+        <p:txBody>
+          <a:bodyPr>
+            <a:normAutofit/>
+          </a:bodyPr>
+          <a:lstStyle/>
+          <a:p>
             <a:endParaRPr lang="en-US"/>
           </a:p>
         </p:txBody>
@@ -2210,27 +2189,6 @@
       </p:sp>
       <p:sp>
         <p:nvSpPr>
-          <p:cNvPr id="3" name="Notes Placeholder 2"/>
-          <p:cNvSpPr>
-            <a:spLocks noGrp="1"/>
-          </p:cNvSpPr>
-          <p:nvPr>
-            <p:ph type="body" idx="1"/>
-          </p:nvPr>
-        </p:nvSpPr>
-        <p:spPr/>
-        <p:txBody>
-          <a:bodyPr>
-            <a:normAutofit/>
-          </a:bodyPr>
-          <a:lstStyle/>
-          <a:p>
-            <a:endParaRPr lang="en-US" dirty="0"/>
-          </a:p>
-        </p:txBody>
-      </p:sp>
-      <p:sp>
-        <p:nvSpPr>
           <p:cNvPr id="4" name="Slide Number Placeholder 3"/>
           <p:cNvSpPr>
             <a:spLocks noGrp="1"/>
@@ -2249,6 +2207,27 @@
               <a:pPr/>
               <a:t>22</a:t>
             </a:fld>
+            <a:endParaRPr lang="en-US"/>
+          </a:p>
+        </p:txBody>
+      </p:sp>
+      <p:sp>
+        <p:nvSpPr>
+          <p:cNvPr id="5" name="Notes Placeholder 4"/>
+          <p:cNvSpPr>
+            <a:spLocks noGrp="1"/>
+          </p:cNvSpPr>
+          <p:nvPr>
+            <p:ph type="body" sz="quarter" idx="11"/>
+          </p:nvPr>
+        </p:nvSpPr>
+        <p:spPr/>
+        <p:txBody>
+          <a:bodyPr>
+            <a:normAutofit/>
+          </a:bodyPr>
+          <a:lstStyle/>
+          <a:p>
             <a:endParaRPr lang="en-US"/>
           </a:p>
         </p:txBody>
@@ -2297,34 +2276,6 @@
       </p:sp>
       <p:sp>
         <p:nvSpPr>
-          <p:cNvPr id="3" name="Notes Placeholder 2"/>
-          <p:cNvSpPr>
-            <a:spLocks noGrp="1"/>
-          </p:cNvSpPr>
-          <p:nvPr>
-            <p:ph type="body" idx="1"/>
-          </p:nvPr>
-        </p:nvSpPr>
-        <p:spPr/>
-        <p:txBody>
-          <a:bodyPr>
-            <a:normAutofit/>
-          </a:bodyPr>
-          <a:lstStyle/>
-          <a:p>
-            <a:endParaRPr lang="en-US" dirty="0" smtClean="0">
-              <a:latin typeface="Arial" charset="0"/>
-            </a:endParaRPr>
-          </a:p>
-          <a:p>
-            <a:endParaRPr lang="en-US" dirty="0" smtClean="0">
-              <a:latin typeface="Arial" charset="0"/>
-            </a:endParaRPr>
-          </a:p>
-        </p:txBody>
-      </p:sp>
-      <p:sp>
-        <p:nvSpPr>
           <p:cNvPr id="4" name="Slide Number Placeholder 3"/>
           <p:cNvSpPr>
             <a:spLocks noGrp="1"/>
@@ -2343,6 +2294,27 @@
               <a:pPr/>
               <a:t>23</a:t>
             </a:fld>
+            <a:endParaRPr lang="en-US"/>
+          </a:p>
+        </p:txBody>
+      </p:sp>
+      <p:sp>
+        <p:nvSpPr>
+          <p:cNvPr id="5" name="Notes Placeholder 4"/>
+          <p:cNvSpPr>
+            <a:spLocks noGrp="1"/>
+          </p:cNvSpPr>
+          <p:nvPr>
+            <p:ph type="body" sz="quarter" idx="11"/>
+          </p:nvPr>
+        </p:nvSpPr>
+        <p:spPr/>
+        <p:txBody>
+          <a:bodyPr>
+            <a:normAutofit/>
+          </a:bodyPr>
+          <a:lstStyle/>
+          <a:p>
             <a:endParaRPr lang="en-US"/>
           </a:p>
         </p:txBody>
@@ -2392,30 +2364,6 @@
       </p:sp>
       <p:sp>
         <p:nvSpPr>
-          <p:cNvPr id="94211" name="Notes Placeholder 2"/>
-          <p:cNvSpPr>
-            <a:spLocks noGrp="1"/>
-          </p:cNvSpPr>
-          <p:nvPr>
-            <p:ph type="body" idx="1"/>
-          </p:nvPr>
-        </p:nvSpPr>
-        <p:spPr>
-          <a:noFill/>
-          <a:ln/>
-        </p:spPr>
-        <p:txBody>
-          <a:bodyPr/>
-          <a:lstStyle/>
-          <a:p>
-            <a:endParaRPr lang="en-US" dirty="0" smtClean="0">
-              <a:latin typeface="Arial" charset="0"/>
-            </a:endParaRPr>
-          </a:p>
-        </p:txBody>
-      </p:sp>
-      <p:sp>
-        <p:nvSpPr>
           <p:cNvPr id="94212" name="Slide Number Placeholder 3"/>
           <p:cNvSpPr>
             <a:spLocks noGrp="1"/>
@@ -2466,6 +2414,27 @@
               <a:ea typeface="+mn-ea"/>
               <a:cs typeface="+mn-cs"/>
             </a:endParaRPr>
+          </a:p>
+        </p:txBody>
+      </p:sp>
+      <p:sp>
+        <p:nvSpPr>
+          <p:cNvPr id="5" name="Notes Placeholder 4"/>
+          <p:cNvSpPr>
+            <a:spLocks noGrp="1"/>
+          </p:cNvSpPr>
+          <p:nvPr>
+            <p:ph type="body" sz="quarter" idx="10"/>
+          </p:nvPr>
+        </p:nvSpPr>
+        <p:spPr/>
+        <p:txBody>
+          <a:bodyPr>
+            <a:normAutofit/>
+          </a:bodyPr>
+          <a:lstStyle/>
+          <a:p>
+            <a:endParaRPr lang="en-US"/>
           </a:p>
         </p:txBody>
       </p:sp>
@@ -2514,30 +2483,6 @@
       </p:sp>
       <p:sp>
         <p:nvSpPr>
-          <p:cNvPr id="95235" name="Notes Placeholder 2"/>
-          <p:cNvSpPr>
-            <a:spLocks noGrp="1"/>
-          </p:cNvSpPr>
-          <p:nvPr>
-            <p:ph type="body" idx="1"/>
-          </p:nvPr>
-        </p:nvSpPr>
-        <p:spPr>
-          <a:noFill/>
-          <a:ln/>
-        </p:spPr>
-        <p:txBody>
-          <a:bodyPr/>
-          <a:lstStyle/>
-          <a:p>
-            <a:endParaRPr lang="en-US" dirty="0" smtClean="0">
-              <a:latin typeface="Arial" charset="0"/>
-            </a:endParaRPr>
-          </a:p>
-        </p:txBody>
-      </p:sp>
-      <p:sp>
-        <p:nvSpPr>
           <p:cNvPr id="95236" name="Slide Number Placeholder 3"/>
           <p:cNvSpPr>
             <a:spLocks noGrp="1"/>
@@ -2588,6 +2533,27 @@
               <a:ea typeface="+mn-ea"/>
               <a:cs typeface="+mn-cs"/>
             </a:endParaRPr>
+          </a:p>
+        </p:txBody>
+      </p:sp>
+      <p:sp>
+        <p:nvSpPr>
+          <p:cNvPr id="5" name="Notes Placeholder 4"/>
+          <p:cNvSpPr>
+            <a:spLocks noGrp="1"/>
+          </p:cNvSpPr>
+          <p:nvPr>
+            <p:ph type="body" sz="quarter" idx="10"/>
+          </p:nvPr>
+        </p:nvSpPr>
+        <p:spPr/>
+        <p:txBody>
+          <a:bodyPr>
+            <a:normAutofit/>
+          </a:bodyPr>
+          <a:lstStyle/>
+          <a:p>
+            <a:endParaRPr lang="en-US"/>
           </a:p>
         </p:txBody>
       </p:sp>
@@ -2722,27 +2688,6 @@
       </p:sp>
       <p:sp>
         <p:nvSpPr>
-          <p:cNvPr id="3" name="Notes Placeholder 2"/>
-          <p:cNvSpPr>
-            <a:spLocks noGrp="1"/>
-          </p:cNvSpPr>
-          <p:nvPr>
-            <p:ph type="body" idx="1"/>
-          </p:nvPr>
-        </p:nvSpPr>
-        <p:spPr/>
-        <p:txBody>
-          <a:bodyPr>
-            <a:normAutofit/>
-          </a:bodyPr>
-          <a:lstStyle/>
-          <a:p>
-            <a:endParaRPr lang="en-US" dirty="0"/>
-          </a:p>
-        </p:txBody>
-      </p:sp>
-      <p:sp>
-        <p:nvSpPr>
           <p:cNvPr id="4" name="Slide Number Placeholder 3"/>
           <p:cNvSpPr>
             <a:spLocks noGrp="1"/>
@@ -2761,6 +2706,27 @@
               <a:pPr/>
               <a:t>27</a:t>
             </a:fld>
+            <a:endParaRPr lang="en-US"/>
+          </a:p>
+        </p:txBody>
+      </p:sp>
+      <p:sp>
+        <p:nvSpPr>
+          <p:cNvPr id="5" name="Notes Placeholder 4"/>
+          <p:cNvSpPr>
+            <a:spLocks noGrp="1"/>
+          </p:cNvSpPr>
+          <p:nvPr>
+            <p:ph type="body" sz="quarter" idx="11"/>
+          </p:nvPr>
+        </p:nvSpPr>
+        <p:spPr/>
+        <p:txBody>
+          <a:bodyPr>
+            <a:normAutofit/>
+          </a:bodyPr>
+          <a:lstStyle/>
+          <a:p>
             <a:endParaRPr lang="en-US"/>
           </a:p>
         </p:txBody>
@@ -2809,27 +2775,6 @@
       </p:sp>
       <p:sp>
         <p:nvSpPr>
-          <p:cNvPr id="3" name="Notes Placeholder 2"/>
-          <p:cNvSpPr>
-            <a:spLocks noGrp="1"/>
-          </p:cNvSpPr>
-          <p:nvPr>
-            <p:ph type="body" idx="1"/>
-          </p:nvPr>
-        </p:nvSpPr>
-        <p:spPr/>
-        <p:txBody>
-          <a:bodyPr>
-            <a:normAutofit/>
-          </a:bodyPr>
-          <a:lstStyle/>
-          <a:p>
-            <a:endParaRPr lang="en-US" dirty="0"/>
-          </a:p>
-        </p:txBody>
-      </p:sp>
-      <p:sp>
-        <p:nvSpPr>
           <p:cNvPr id="4" name="Slide Number Placeholder 3"/>
           <p:cNvSpPr>
             <a:spLocks noGrp="1"/>
@@ -2848,6 +2793,27 @@
               <a:pPr/>
               <a:t>28</a:t>
             </a:fld>
+            <a:endParaRPr lang="en-US"/>
+          </a:p>
+        </p:txBody>
+      </p:sp>
+      <p:sp>
+        <p:nvSpPr>
+          <p:cNvPr id="5" name="Notes Placeholder 4"/>
+          <p:cNvSpPr>
+            <a:spLocks noGrp="1"/>
+          </p:cNvSpPr>
+          <p:nvPr>
+            <p:ph type="body" sz="quarter" idx="11"/>
+          </p:nvPr>
+        </p:nvSpPr>
+        <p:spPr/>
+        <p:txBody>
+          <a:bodyPr>
+            <a:normAutofit/>
+          </a:bodyPr>
+          <a:lstStyle/>
+          <a:p>
             <a:endParaRPr lang="en-US"/>
           </a:p>
         </p:txBody>
@@ -2897,28 +2863,6 @@
       </p:sp>
       <p:sp>
         <p:nvSpPr>
-          <p:cNvPr id="34819" name="Notes Placeholder 2"/>
-          <p:cNvSpPr>
-            <a:spLocks noGrp="1"/>
-          </p:cNvSpPr>
-          <p:nvPr>
-            <p:ph type="body" idx="1"/>
-          </p:nvPr>
-        </p:nvSpPr>
-        <p:spPr>
-          <a:noFill/>
-          <a:ln/>
-        </p:spPr>
-        <p:txBody>
-          <a:bodyPr/>
-          <a:lstStyle/>
-          <a:p>
-            <a:endParaRPr lang="en-US" dirty="0" smtClean="0"/>
-          </a:p>
-        </p:txBody>
-      </p:sp>
-      <p:sp>
-        <p:nvSpPr>
           <p:cNvPr id="34820" name="Slide Number Placeholder 3"/>
           <p:cNvSpPr>
             <a:spLocks noGrp="1"/>
@@ -2940,6 +2884,27 @@
               <a:t>29</a:t>
             </a:fld>
             <a:endParaRPr lang="en-US" smtClean="0"/>
+          </a:p>
+        </p:txBody>
+      </p:sp>
+      <p:sp>
+        <p:nvSpPr>
+          <p:cNvPr id="5" name="Notes Placeholder 4"/>
+          <p:cNvSpPr>
+            <a:spLocks noGrp="1"/>
+          </p:cNvSpPr>
+          <p:nvPr>
+            <p:ph type="body" sz="quarter" idx="10"/>
+          </p:nvPr>
+        </p:nvSpPr>
+        <p:spPr/>
+        <p:txBody>
+          <a:bodyPr>
+            <a:normAutofit/>
+          </a:bodyPr>
+          <a:lstStyle/>
+          <a:p>
+            <a:endParaRPr lang="en-US"/>
           </a:p>
         </p:txBody>
       </p:sp>
@@ -2987,27 +2952,6 @@
       </p:sp>
       <p:sp>
         <p:nvSpPr>
-          <p:cNvPr id="3" name="Notes Placeholder 2"/>
-          <p:cNvSpPr>
-            <a:spLocks noGrp="1"/>
-          </p:cNvSpPr>
-          <p:nvPr>
-            <p:ph type="body" idx="1"/>
-          </p:nvPr>
-        </p:nvSpPr>
-        <p:spPr/>
-        <p:txBody>
-          <a:bodyPr>
-            <a:normAutofit/>
-          </a:bodyPr>
-          <a:lstStyle/>
-          <a:p>
-            <a:endParaRPr lang="en-US" dirty="0"/>
-          </a:p>
-        </p:txBody>
-      </p:sp>
-      <p:sp>
-        <p:nvSpPr>
           <p:cNvPr id="4" name="Slide Number Placeholder 3"/>
           <p:cNvSpPr>
             <a:spLocks noGrp="1"/>
@@ -3026,6 +2970,27 @@
               <a:pPr/>
               <a:t>3</a:t>
             </a:fld>
+            <a:endParaRPr lang="en-US"/>
+          </a:p>
+        </p:txBody>
+      </p:sp>
+      <p:sp>
+        <p:nvSpPr>
+          <p:cNvPr id="5" name="Notes Placeholder 4"/>
+          <p:cNvSpPr>
+            <a:spLocks noGrp="1"/>
+          </p:cNvSpPr>
+          <p:nvPr>
+            <p:ph type="body" sz="quarter" idx="11"/>
+          </p:nvPr>
+        </p:nvSpPr>
+        <p:spPr/>
+        <p:txBody>
+          <a:bodyPr>
+            <a:normAutofit/>
+          </a:bodyPr>
+          <a:lstStyle/>
+          <a:p>
             <a:endParaRPr lang="en-US"/>
           </a:p>
         </p:txBody>
@@ -3102,38 +3067,6 @@
           <a:ln/>
         </p:spPr>
       </p:sp>
-      <p:sp>
-        <p:nvSpPr>
-          <p:cNvPr id="35844" name="Rectangle 3"/>
-          <p:cNvSpPr>
-            <a:spLocks noGrp="1" noChangeArrowheads="1"/>
-          </p:cNvSpPr>
-          <p:nvPr>
-            <p:ph type="body" idx="1"/>
-          </p:nvPr>
-        </p:nvSpPr>
-        <p:spPr>
-          <a:xfrm>
-            <a:off x="923925" y="4379913"/>
-            <a:ext cx="5086350" cy="4148137"/>
-          </a:xfrm>
-          <a:solidFill>
-            <a:srgbClr val="FFFFFF"/>
-          </a:solidFill>
-          <a:ln>
-            <a:solidFill>
-              <a:srgbClr val="000000"/>
-            </a:solidFill>
-          </a:ln>
-        </p:spPr>
-        <p:txBody>
-          <a:bodyPr/>
-          <a:lstStyle/>
-          <a:p>
-            <a:endParaRPr lang="en-US" dirty="0" smtClean="0"/>
-          </a:p>
-        </p:txBody>
-      </p:sp>
     </p:spTree>
   </p:cSld>
   <p:clrMapOvr>
@@ -3179,28 +3112,6 @@
       </p:sp>
       <p:sp>
         <p:nvSpPr>
-          <p:cNvPr id="41987" name="Notes Placeholder 2"/>
-          <p:cNvSpPr>
-            <a:spLocks noGrp="1"/>
-          </p:cNvSpPr>
-          <p:nvPr>
-            <p:ph type="body" idx="1"/>
-          </p:nvPr>
-        </p:nvSpPr>
-        <p:spPr>
-          <a:noFill/>
-          <a:ln/>
-        </p:spPr>
-        <p:txBody>
-          <a:bodyPr/>
-          <a:lstStyle/>
-          <a:p>
-            <a:endParaRPr lang="en-US" dirty="0" smtClean="0"/>
-          </a:p>
-        </p:txBody>
-      </p:sp>
-      <p:sp>
-        <p:nvSpPr>
           <p:cNvPr id="41988" name="Slide Number Placeholder 3"/>
           <p:cNvSpPr>
             <a:spLocks noGrp="1"/>
@@ -3222,6 +3133,27 @@
               <a:t>31</a:t>
             </a:fld>
             <a:endParaRPr lang="en-US" smtClean="0"/>
+          </a:p>
+        </p:txBody>
+      </p:sp>
+      <p:sp>
+        <p:nvSpPr>
+          <p:cNvPr id="5" name="Notes Placeholder 4"/>
+          <p:cNvSpPr>
+            <a:spLocks noGrp="1"/>
+          </p:cNvSpPr>
+          <p:nvPr>
+            <p:ph type="body" sz="quarter" idx="10"/>
+          </p:nvPr>
+        </p:nvSpPr>
+        <p:spPr/>
+        <p:txBody>
+          <a:bodyPr>
+            <a:normAutofit/>
+          </a:bodyPr>
+          <a:lstStyle/>
+          <a:p>
+            <a:endParaRPr lang="en-US"/>
           </a:p>
         </p:txBody>
       </p:sp>
@@ -3269,27 +3201,6 @@
       </p:sp>
       <p:sp>
         <p:nvSpPr>
-          <p:cNvPr id="3" name="Notes Placeholder 2"/>
-          <p:cNvSpPr>
-            <a:spLocks noGrp="1"/>
-          </p:cNvSpPr>
-          <p:nvPr>
-            <p:ph type="body" idx="1"/>
-          </p:nvPr>
-        </p:nvSpPr>
-        <p:spPr/>
-        <p:txBody>
-          <a:bodyPr>
-            <a:normAutofit/>
-          </a:bodyPr>
-          <a:lstStyle/>
-          <a:p>
-            <a:endParaRPr lang="en-US" dirty="0" smtClean="0"/>
-          </a:p>
-        </p:txBody>
-      </p:sp>
-      <p:sp>
-        <p:nvSpPr>
           <p:cNvPr id="4" name="Slide Number Placeholder 3"/>
           <p:cNvSpPr>
             <a:spLocks noGrp="1"/>
@@ -3308,6 +3219,27 @@
               <a:pPr/>
               <a:t>32</a:t>
             </a:fld>
+            <a:endParaRPr lang="en-US"/>
+          </a:p>
+        </p:txBody>
+      </p:sp>
+      <p:sp>
+        <p:nvSpPr>
+          <p:cNvPr id="5" name="Notes Placeholder 4"/>
+          <p:cNvSpPr>
+            <a:spLocks noGrp="1"/>
+          </p:cNvSpPr>
+          <p:nvPr>
+            <p:ph type="body" sz="quarter" idx="11"/>
+          </p:nvPr>
+        </p:nvSpPr>
+        <p:spPr/>
+        <p:txBody>
+          <a:bodyPr>
+            <a:normAutofit/>
+          </a:bodyPr>
+          <a:lstStyle/>
+          <a:p>
             <a:endParaRPr lang="en-US"/>
           </a:p>
         </p:txBody>
@@ -3356,27 +3288,6 @@
       </p:sp>
       <p:sp>
         <p:nvSpPr>
-          <p:cNvPr id="3" name="Notes Placeholder 2"/>
-          <p:cNvSpPr>
-            <a:spLocks noGrp="1"/>
-          </p:cNvSpPr>
-          <p:nvPr>
-            <p:ph type="body" idx="1"/>
-          </p:nvPr>
-        </p:nvSpPr>
-        <p:spPr/>
-        <p:txBody>
-          <a:bodyPr>
-            <a:normAutofit/>
-          </a:bodyPr>
-          <a:lstStyle/>
-          <a:p>
-            <a:endParaRPr lang="en-US" baseline="0" dirty="0" smtClean="0"/>
-          </a:p>
-        </p:txBody>
-      </p:sp>
-      <p:sp>
-        <p:nvSpPr>
           <p:cNvPr id="4" name="Slide Number Placeholder 3"/>
           <p:cNvSpPr>
             <a:spLocks noGrp="1"/>
@@ -3395,6 +3306,27 @@
               <a:pPr/>
               <a:t>33</a:t>
             </a:fld>
+            <a:endParaRPr lang="en-US"/>
+          </a:p>
+        </p:txBody>
+      </p:sp>
+      <p:sp>
+        <p:nvSpPr>
+          <p:cNvPr id="5" name="Notes Placeholder 4"/>
+          <p:cNvSpPr>
+            <a:spLocks noGrp="1"/>
+          </p:cNvSpPr>
+          <p:nvPr>
+            <p:ph type="body" sz="quarter" idx="11"/>
+          </p:nvPr>
+        </p:nvSpPr>
+        <p:spPr/>
+        <p:txBody>
+          <a:bodyPr>
+            <a:normAutofit/>
+          </a:bodyPr>
+          <a:lstStyle/>
+          <a:p>
             <a:endParaRPr lang="en-US"/>
           </a:p>
         </p:txBody>
@@ -3443,27 +3375,6 @@
       </p:sp>
       <p:sp>
         <p:nvSpPr>
-          <p:cNvPr id="3" name="Notes Placeholder 2"/>
-          <p:cNvSpPr>
-            <a:spLocks noGrp="1"/>
-          </p:cNvSpPr>
-          <p:nvPr>
-            <p:ph type="body" idx="1"/>
-          </p:nvPr>
-        </p:nvSpPr>
-        <p:spPr/>
-        <p:txBody>
-          <a:bodyPr>
-            <a:normAutofit/>
-          </a:bodyPr>
-          <a:lstStyle/>
-          <a:p>
-            <a:endParaRPr lang="en-US" dirty="0"/>
-          </a:p>
-        </p:txBody>
-      </p:sp>
-      <p:sp>
-        <p:nvSpPr>
           <p:cNvPr id="4" name="Slide Number Placeholder 3"/>
           <p:cNvSpPr>
             <a:spLocks noGrp="1"/>
@@ -3482,6 +3393,27 @@
               <a:pPr/>
               <a:t>34</a:t>
             </a:fld>
+            <a:endParaRPr lang="en-US"/>
+          </a:p>
+        </p:txBody>
+      </p:sp>
+      <p:sp>
+        <p:nvSpPr>
+          <p:cNvPr id="5" name="Notes Placeholder 4"/>
+          <p:cNvSpPr>
+            <a:spLocks noGrp="1"/>
+          </p:cNvSpPr>
+          <p:nvPr>
+            <p:ph type="body" sz="quarter" idx="11"/>
+          </p:nvPr>
+        </p:nvSpPr>
+        <p:spPr/>
+        <p:txBody>
+          <a:bodyPr>
+            <a:normAutofit/>
+          </a:bodyPr>
+          <a:lstStyle/>
+          <a:p>
             <a:endParaRPr lang="en-US"/>
           </a:p>
         </p:txBody>
@@ -3530,35 +3462,6 @@
       </p:sp>
       <p:sp>
         <p:nvSpPr>
-          <p:cNvPr id="3" name="Notes Placeholder 2"/>
-          <p:cNvSpPr>
-            <a:spLocks noGrp="1"/>
-          </p:cNvSpPr>
-          <p:nvPr>
-            <p:ph type="body" idx="1"/>
-          </p:nvPr>
-        </p:nvSpPr>
-        <p:spPr/>
-        <p:txBody>
-          <a:bodyPr>
-            <a:normAutofit/>
-          </a:bodyPr>
-          <a:lstStyle/>
-          <a:p>
-            <a:endParaRPr lang="en-US" dirty="0" smtClean="0">
-              <a:latin typeface="Arial" charset="0"/>
-            </a:endParaRPr>
-          </a:p>
-          <a:p>
-            <a:endParaRPr lang="en-US" dirty="0" smtClean="0"/>
-          </a:p>
-          <a:p>
-            <a:endParaRPr lang="en-US" dirty="0" smtClean="0"/>
-          </a:p>
-        </p:txBody>
-      </p:sp>
-      <p:sp>
-        <p:nvSpPr>
           <p:cNvPr id="4" name="Slide Number Placeholder 3"/>
           <p:cNvSpPr>
             <a:spLocks noGrp="1"/>
@@ -3577,6 +3480,27 @@
               <a:pPr/>
               <a:t>35</a:t>
             </a:fld>
+            <a:endParaRPr lang="en-US"/>
+          </a:p>
+        </p:txBody>
+      </p:sp>
+      <p:sp>
+        <p:nvSpPr>
+          <p:cNvPr id="5" name="Notes Placeholder 4"/>
+          <p:cNvSpPr>
+            <a:spLocks noGrp="1"/>
+          </p:cNvSpPr>
+          <p:nvPr>
+            <p:ph type="body" sz="quarter" idx="11"/>
+          </p:nvPr>
+        </p:nvSpPr>
+        <p:spPr/>
+        <p:txBody>
+          <a:bodyPr>
+            <a:normAutofit/>
+          </a:bodyPr>
+          <a:lstStyle/>
+          <a:p>
             <a:endParaRPr lang="en-US"/>
           </a:p>
         </p:txBody>
@@ -3625,67 +3549,6 @@
       </p:sp>
       <p:sp>
         <p:nvSpPr>
-          <p:cNvPr id="3" name="Notes Placeholder 2"/>
-          <p:cNvSpPr>
-            <a:spLocks noGrp="1"/>
-          </p:cNvSpPr>
-          <p:nvPr>
-            <p:ph type="body" idx="1"/>
-          </p:nvPr>
-        </p:nvSpPr>
-        <p:spPr/>
-        <p:txBody>
-          <a:bodyPr>
-            <a:normAutofit/>
-          </a:bodyPr>
-          <a:lstStyle/>
-          <a:p>
-            <a:pPr marL="0" marR="0" indent="0" algn="l" defTabSz="914400" rtl="0" eaLnBrk="1" fontAlgn="base" latinLnBrk="0" hangingPunct="1">
-              <a:lnSpc>
-                <a:spcPct val="100000"/>
-              </a:lnSpc>
-              <a:spcBef>
-                <a:spcPct val="30000"/>
-              </a:spcBef>
-              <a:spcAft>
-                <a:spcPct val="0"/>
-              </a:spcAft>
-              <a:buClrTx/>
-              <a:buSzTx/>
-              <a:buFontTx/>
-              <a:buNone/>
-              <a:tabLst/>
-              <a:defRPr/>
-            </a:pPr>
-            <a:endParaRPr lang="en-US" dirty="0" smtClean="0"/>
-          </a:p>
-          <a:p>
-            <a:pPr marL="0" marR="0" indent="0" algn="l" defTabSz="914400" rtl="0" eaLnBrk="1" fontAlgn="base" latinLnBrk="0" hangingPunct="1">
-              <a:lnSpc>
-                <a:spcPct val="100000"/>
-              </a:lnSpc>
-              <a:spcBef>
-                <a:spcPct val="30000"/>
-              </a:spcBef>
-              <a:spcAft>
-                <a:spcPct val="0"/>
-              </a:spcAft>
-              <a:buClrTx/>
-              <a:buSzTx/>
-              <a:buFontTx/>
-              <a:buNone/>
-              <a:tabLst/>
-              <a:defRPr/>
-            </a:pPr>
-            <a:endParaRPr lang="en-US" dirty="0" smtClean="0"/>
-          </a:p>
-          <a:p>
-            <a:endParaRPr lang="en-US" dirty="0"/>
-          </a:p>
-        </p:txBody>
-      </p:sp>
-      <p:sp>
-        <p:nvSpPr>
           <p:cNvPr id="4" name="Slide Number Placeholder 3"/>
           <p:cNvSpPr>
             <a:spLocks noGrp="1"/>
@@ -3704,6 +3567,27 @@
               <a:pPr/>
               <a:t>36</a:t>
             </a:fld>
+            <a:endParaRPr lang="en-US"/>
+          </a:p>
+        </p:txBody>
+      </p:sp>
+      <p:sp>
+        <p:nvSpPr>
+          <p:cNvPr id="5" name="Notes Placeholder 4"/>
+          <p:cNvSpPr>
+            <a:spLocks noGrp="1"/>
+          </p:cNvSpPr>
+          <p:nvPr>
+            <p:ph type="body" sz="quarter" idx="11"/>
+          </p:nvPr>
+        </p:nvSpPr>
+        <p:spPr/>
+        <p:txBody>
+          <a:bodyPr>
+            <a:normAutofit/>
+          </a:bodyPr>
+          <a:lstStyle/>
+          <a:p>
             <a:endParaRPr lang="en-US"/>
           </a:p>
         </p:txBody>
@@ -3752,27 +3636,6 @@
       </p:sp>
       <p:sp>
         <p:nvSpPr>
-          <p:cNvPr id="3" name="Notes Placeholder 2"/>
-          <p:cNvSpPr>
-            <a:spLocks noGrp="1"/>
-          </p:cNvSpPr>
-          <p:nvPr>
-            <p:ph type="body" idx="1"/>
-          </p:nvPr>
-        </p:nvSpPr>
-        <p:spPr/>
-        <p:txBody>
-          <a:bodyPr>
-            <a:normAutofit/>
-          </a:bodyPr>
-          <a:lstStyle/>
-          <a:p>
-            <a:endParaRPr lang="en-US" dirty="0"/>
-          </a:p>
-        </p:txBody>
-      </p:sp>
-      <p:sp>
-        <p:nvSpPr>
           <p:cNvPr id="4" name="Slide Number Placeholder 3"/>
           <p:cNvSpPr>
             <a:spLocks noGrp="1"/>
@@ -3791,6 +3654,27 @@
               <a:pPr/>
               <a:t>37</a:t>
             </a:fld>
+            <a:endParaRPr lang="en-US"/>
+          </a:p>
+        </p:txBody>
+      </p:sp>
+      <p:sp>
+        <p:nvSpPr>
+          <p:cNvPr id="5" name="Notes Placeholder 4"/>
+          <p:cNvSpPr>
+            <a:spLocks noGrp="1"/>
+          </p:cNvSpPr>
+          <p:nvPr>
+            <p:ph type="body" sz="quarter" idx="11"/>
+          </p:nvPr>
+        </p:nvSpPr>
+        <p:spPr/>
+        <p:txBody>
+          <a:bodyPr>
+            <a:normAutofit/>
+          </a:bodyPr>
+          <a:lstStyle/>
+          <a:p>
             <a:endParaRPr lang="en-US"/>
           </a:p>
         </p:txBody>
@@ -3839,27 +3723,6 @@
       </p:sp>
       <p:sp>
         <p:nvSpPr>
-          <p:cNvPr id="3" name="Notes Placeholder 2"/>
-          <p:cNvSpPr>
-            <a:spLocks noGrp="1"/>
-          </p:cNvSpPr>
-          <p:nvPr>
-            <p:ph type="body" idx="1"/>
-          </p:nvPr>
-        </p:nvSpPr>
-        <p:spPr/>
-        <p:txBody>
-          <a:bodyPr>
-            <a:normAutofit/>
-          </a:bodyPr>
-          <a:lstStyle/>
-          <a:p>
-            <a:endParaRPr lang="en-CA" dirty="0" smtClean="0"/>
-          </a:p>
-        </p:txBody>
-      </p:sp>
-      <p:sp>
-        <p:nvSpPr>
           <p:cNvPr id="4" name="Slide Number Placeholder 3"/>
           <p:cNvSpPr>
             <a:spLocks noGrp="1"/>
@@ -3878,6 +3741,27 @@
               <a:pPr/>
               <a:t>38</a:t>
             </a:fld>
+            <a:endParaRPr lang="en-US"/>
+          </a:p>
+        </p:txBody>
+      </p:sp>
+      <p:sp>
+        <p:nvSpPr>
+          <p:cNvPr id="5" name="Notes Placeholder 4"/>
+          <p:cNvSpPr>
+            <a:spLocks noGrp="1"/>
+          </p:cNvSpPr>
+          <p:nvPr>
+            <p:ph type="body" sz="quarter" idx="11"/>
+          </p:nvPr>
+        </p:nvSpPr>
+        <p:spPr/>
+        <p:txBody>
+          <a:bodyPr>
+            <a:normAutofit/>
+          </a:bodyPr>
+          <a:lstStyle/>
+          <a:p>
             <a:endParaRPr lang="en-US"/>
           </a:p>
         </p:txBody>
@@ -3954,38 +3838,6 @@
           <a:ln/>
         </p:spPr>
       </p:sp>
-      <p:sp>
-        <p:nvSpPr>
-          <p:cNvPr id="36868" name="Rectangle 3"/>
-          <p:cNvSpPr>
-            <a:spLocks noGrp="1" noChangeArrowheads="1"/>
-          </p:cNvSpPr>
-          <p:nvPr>
-            <p:ph type="body" idx="1"/>
-          </p:nvPr>
-        </p:nvSpPr>
-        <p:spPr>
-          <a:xfrm>
-            <a:off x="923925" y="4379913"/>
-            <a:ext cx="5086350" cy="4148137"/>
-          </a:xfrm>
-          <a:solidFill>
-            <a:srgbClr val="FFFFFF"/>
-          </a:solidFill>
-          <a:ln>
-            <a:solidFill>
-              <a:srgbClr val="000000"/>
-            </a:solidFill>
-          </a:ln>
-        </p:spPr>
-        <p:txBody>
-          <a:bodyPr/>
-          <a:lstStyle/>
-          <a:p>
-            <a:endParaRPr lang="en-US" dirty="0" smtClean="0"/>
-          </a:p>
-        </p:txBody>
-      </p:sp>
     </p:spTree>
   </p:cSld>
   <p:clrMapOvr>
@@ -4031,47 +3883,6 @@
       </p:sp>
       <p:sp>
         <p:nvSpPr>
-          <p:cNvPr id="86019" name="Notes Placeholder 2"/>
-          <p:cNvSpPr>
-            <a:spLocks noGrp="1"/>
-          </p:cNvSpPr>
-          <p:nvPr>
-            <p:ph type="body" idx="1"/>
-          </p:nvPr>
-        </p:nvSpPr>
-        <p:spPr>
-          <a:noFill/>
-          <a:ln/>
-        </p:spPr>
-        <p:txBody>
-          <a:bodyPr/>
-          <a:lstStyle/>
-          <a:p>
-            <a:pPr marL="0" marR="0" indent="0" algn="l" defTabSz="914400" rtl="0" eaLnBrk="1" fontAlgn="base" latinLnBrk="0" hangingPunct="1">
-              <a:lnSpc>
-                <a:spcPct val="100000"/>
-              </a:lnSpc>
-              <a:spcBef>
-                <a:spcPct val="30000"/>
-              </a:spcBef>
-              <a:spcAft>
-                <a:spcPct val="0"/>
-              </a:spcAft>
-              <a:buClrTx/>
-              <a:buSzTx/>
-              <a:buFontTx/>
-              <a:buNone/>
-              <a:tabLst/>
-              <a:defRPr/>
-            </a:pPr>
-            <a:endParaRPr lang="en-US" dirty="0" smtClean="0">
-              <a:latin typeface="Arial" charset="0"/>
-            </a:endParaRPr>
-          </a:p>
-        </p:txBody>
-      </p:sp>
-      <p:sp>
-        <p:nvSpPr>
           <p:cNvPr id="86020" name="Slide Number Placeholder 3"/>
           <p:cNvSpPr>
             <a:spLocks noGrp="1"/>
@@ -4122,6 +3933,27 @@
               <a:ea typeface="+mn-ea"/>
               <a:cs typeface="+mn-cs"/>
             </a:endParaRPr>
+          </a:p>
+        </p:txBody>
+      </p:sp>
+      <p:sp>
+        <p:nvSpPr>
+          <p:cNvPr id="5" name="Notes Placeholder 4"/>
+          <p:cNvSpPr>
+            <a:spLocks noGrp="1"/>
+          </p:cNvSpPr>
+          <p:nvPr>
+            <p:ph type="body" sz="quarter" idx="10"/>
+          </p:nvPr>
+        </p:nvSpPr>
+        <p:spPr/>
+        <p:txBody>
+          <a:bodyPr>
+            <a:normAutofit/>
+          </a:bodyPr>
+          <a:lstStyle/>
+          <a:p>
+            <a:endParaRPr lang="en-US"/>
           </a:p>
         </p:txBody>
       </p:sp>
@@ -4197,44 +4029,6 @@
           <a:ln/>
         </p:spPr>
       </p:sp>
-      <p:sp>
-        <p:nvSpPr>
-          <p:cNvPr id="37892" name="Rectangle 3"/>
-          <p:cNvSpPr>
-            <a:spLocks noGrp="1" noChangeArrowheads="1"/>
-          </p:cNvSpPr>
-          <p:nvPr>
-            <p:ph type="body" idx="1"/>
-          </p:nvPr>
-        </p:nvSpPr>
-        <p:spPr>
-          <a:xfrm>
-            <a:off x="923925" y="4379913"/>
-            <a:ext cx="5086350" cy="4148137"/>
-          </a:xfrm>
-          <a:solidFill>
-            <a:srgbClr val="FFFFFF"/>
-          </a:solidFill>
-          <a:ln>
-            <a:solidFill>
-              <a:srgbClr val="000000"/>
-            </a:solidFill>
-          </a:ln>
-        </p:spPr>
-        <p:txBody>
-          <a:bodyPr/>
-          <a:lstStyle/>
-          <a:p>
-            <a:endParaRPr lang="en-US" dirty="0" smtClean="0"/>
-          </a:p>
-          <a:p>
-            <a:endParaRPr lang="en-US" dirty="0" smtClean="0"/>
-          </a:p>
-          <a:p>
-            <a:endParaRPr lang="en-US" dirty="0" smtClean="0"/>
-          </a:p>
-        </p:txBody>
-      </p:sp>
     </p:spTree>
   </p:cSld>
   <p:clrMapOvr>
@@ -4279,27 +4073,6 @@
       </p:sp>
       <p:sp>
         <p:nvSpPr>
-          <p:cNvPr id="3" name="Notes Placeholder 2"/>
-          <p:cNvSpPr>
-            <a:spLocks noGrp="1"/>
-          </p:cNvSpPr>
-          <p:nvPr>
-            <p:ph type="body" idx="1"/>
-          </p:nvPr>
-        </p:nvSpPr>
-        <p:spPr/>
-        <p:txBody>
-          <a:bodyPr>
-            <a:normAutofit/>
-          </a:bodyPr>
-          <a:lstStyle/>
-          <a:p>
-            <a:endParaRPr lang="en-US" dirty="0"/>
-          </a:p>
-        </p:txBody>
-      </p:sp>
-      <p:sp>
-        <p:nvSpPr>
           <p:cNvPr id="4" name="Slide Number Placeholder 3"/>
           <p:cNvSpPr>
             <a:spLocks noGrp="1"/>
@@ -4318,6 +4091,27 @@
               <a:pPr/>
               <a:t>41</a:t>
             </a:fld>
+            <a:endParaRPr lang="en-US"/>
+          </a:p>
+        </p:txBody>
+      </p:sp>
+      <p:sp>
+        <p:nvSpPr>
+          <p:cNvPr id="5" name="Notes Placeholder 4"/>
+          <p:cNvSpPr>
+            <a:spLocks noGrp="1"/>
+          </p:cNvSpPr>
+          <p:nvPr>
+            <p:ph type="body" sz="quarter" idx="11"/>
+          </p:nvPr>
+        </p:nvSpPr>
+        <p:spPr/>
+        <p:txBody>
+          <a:bodyPr>
+            <a:normAutofit/>
+          </a:bodyPr>
+          <a:lstStyle/>
+          <a:p>
             <a:endParaRPr lang="en-US"/>
           </a:p>
         </p:txBody>
@@ -4366,27 +4160,6 @@
       </p:sp>
       <p:sp>
         <p:nvSpPr>
-          <p:cNvPr id="3" name="Notes Placeholder 2"/>
-          <p:cNvSpPr>
-            <a:spLocks noGrp="1"/>
-          </p:cNvSpPr>
-          <p:nvPr>
-            <p:ph type="body" idx="1"/>
-          </p:nvPr>
-        </p:nvSpPr>
-        <p:spPr/>
-        <p:txBody>
-          <a:bodyPr>
-            <a:normAutofit/>
-          </a:bodyPr>
-          <a:lstStyle/>
-          <a:p>
-            <a:endParaRPr lang="en-US" dirty="0"/>
-          </a:p>
-        </p:txBody>
-      </p:sp>
-      <p:sp>
-        <p:nvSpPr>
           <p:cNvPr id="4" name="Slide Number Placeholder 3"/>
           <p:cNvSpPr>
             <a:spLocks noGrp="1"/>
@@ -4405,6 +4178,27 @@
               <a:pPr/>
               <a:t>42</a:t>
             </a:fld>
+            <a:endParaRPr lang="en-US"/>
+          </a:p>
+        </p:txBody>
+      </p:sp>
+      <p:sp>
+        <p:nvSpPr>
+          <p:cNvPr id="5" name="Notes Placeholder 4"/>
+          <p:cNvSpPr>
+            <a:spLocks noGrp="1"/>
+          </p:cNvSpPr>
+          <p:nvPr>
+            <p:ph type="body" sz="quarter" idx="11"/>
+          </p:nvPr>
+        </p:nvSpPr>
+        <p:spPr/>
+        <p:txBody>
+          <a:bodyPr>
+            <a:normAutofit/>
+          </a:bodyPr>
+          <a:lstStyle/>
+          <a:p>
             <a:endParaRPr lang="en-US"/>
           </a:p>
         </p:txBody>
@@ -4453,44 +4247,6 @@
       </p:sp>
       <p:sp>
         <p:nvSpPr>
-          <p:cNvPr id="3" name="Notes Placeholder 2"/>
-          <p:cNvSpPr>
-            <a:spLocks noGrp="1"/>
-          </p:cNvSpPr>
-          <p:nvPr>
-            <p:ph type="body" idx="1"/>
-          </p:nvPr>
-        </p:nvSpPr>
-        <p:spPr/>
-        <p:txBody>
-          <a:bodyPr>
-            <a:normAutofit/>
-          </a:bodyPr>
-          <a:lstStyle/>
-          <a:p>
-            <a:pPr marL="0" marR="0" indent="0" algn="l" defTabSz="914400" rtl="0" eaLnBrk="1" fontAlgn="base" latinLnBrk="0" hangingPunct="1">
-              <a:lnSpc>
-                <a:spcPct val="100000"/>
-              </a:lnSpc>
-              <a:spcBef>
-                <a:spcPct val="30000"/>
-              </a:spcBef>
-              <a:spcAft>
-                <a:spcPct val="0"/>
-              </a:spcAft>
-              <a:buClrTx/>
-              <a:buSzTx/>
-              <a:buFontTx/>
-              <a:buNone/>
-              <a:tabLst/>
-              <a:defRPr/>
-            </a:pPr>
-            <a:endParaRPr lang="en-US" dirty="0" smtClean="0"/>
-          </a:p>
-        </p:txBody>
-      </p:sp>
-      <p:sp>
-        <p:nvSpPr>
           <p:cNvPr id="4" name="Slide Number Placeholder 3"/>
           <p:cNvSpPr>
             <a:spLocks noGrp="1"/>
@@ -4509,6 +4265,27 @@
               <a:pPr/>
               <a:t>43</a:t>
             </a:fld>
+            <a:endParaRPr lang="en-US"/>
+          </a:p>
+        </p:txBody>
+      </p:sp>
+      <p:sp>
+        <p:nvSpPr>
+          <p:cNvPr id="5" name="Notes Placeholder 4"/>
+          <p:cNvSpPr>
+            <a:spLocks noGrp="1"/>
+          </p:cNvSpPr>
+          <p:nvPr>
+            <p:ph type="body" sz="quarter" idx="11"/>
+          </p:nvPr>
+        </p:nvSpPr>
+        <p:spPr/>
+        <p:txBody>
+          <a:bodyPr>
+            <a:normAutofit/>
+          </a:bodyPr>
+          <a:lstStyle/>
+          <a:p>
             <a:endParaRPr lang="en-US"/>
           </a:p>
         </p:txBody>
@@ -4557,64 +4334,6 @@
       </p:sp>
       <p:sp>
         <p:nvSpPr>
-          <p:cNvPr id="3" name="Notes Placeholder 2"/>
-          <p:cNvSpPr>
-            <a:spLocks noGrp="1"/>
-          </p:cNvSpPr>
-          <p:nvPr>
-            <p:ph type="body" idx="1"/>
-          </p:nvPr>
-        </p:nvSpPr>
-        <p:spPr/>
-        <p:txBody>
-          <a:bodyPr>
-            <a:normAutofit/>
-          </a:bodyPr>
-          <a:lstStyle/>
-          <a:p>
-            <a:endParaRPr lang="en-US" sz="1200" kern="1200" dirty="0" smtClean="0">
-              <a:solidFill>
-                <a:schemeClr val="tx1"/>
-              </a:solidFill>
-              <a:latin typeface="Arial" charset="0"/>
-              <a:ea typeface="+mn-ea"/>
-              <a:cs typeface="+mn-cs"/>
-            </a:endParaRPr>
-          </a:p>
-          <a:p>
-            <a:pPr marL="0" marR="0" indent="0" algn="l" defTabSz="914400" rtl="0" eaLnBrk="1" fontAlgn="base" latinLnBrk="0" hangingPunct="1">
-              <a:lnSpc>
-                <a:spcPct val="100000"/>
-              </a:lnSpc>
-              <a:spcBef>
-                <a:spcPct val="30000"/>
-              </a:spcBef>
-              <a:spcAft>
-                <a:spcPct val="0"/>
-              </a:spcAft>
-              <a:buClrTx/>
-              <a:buSzTx/>
-              <a:buFontTx/>
-              <a:buNone/>
-              <a:tabLst/>
-              <a:defRPr/>
-            </a:pPr>
-            <a:endParaRPr lang="en-US" sz="1200" kern="1200" dirty="0" smtClean="0">
-              <a:solidFill>
-                <a:schemeClr val="tx1"/>
-              </a:solidFill>
-              <a:latin typeface="Arial" charset="0"/>
-              <a:ea typeface="+mn-ea"/>
-              <a:cs typeface="+mn-cs"/>
-            </a:endParaRPr>
-          </a:p>
-          <a:p>
-            <a:endParaRPr lang="en-US" dirty="0"/>
-          </a:p>
-        </p:txBody>
-      </p:sp>
-      <p:sp>
-        <p:nvSpPr>
           <p:cNvPr id="4" name="Slide Number Placeholder 3"/>
           <p:cNvSpPr>
             <a:spLocks noGrp="1"/>
@@ -4633,6 +4352,27 @@
               <a:pPr/>
               <a:t>44</a:t>
             </a:fld>
+            <a:endParaRPr lang="en-US"/>
+          </a:p>
+        </p:txBody>
+      </p:sp>
+      <p:sp>
+        <p:nvSpPr>
+          <p:cNvPr id="5" name="Notes Placeholder 4"/>
+          <p:cNvSpPr>
+            <a:spLocks noGrp="1"/>
+          </p:cNvSpPr>
+          <p:nvPr>
+            <p:ph type="body" sz="quarter" idx="11"/>
+          </p:nvPr>
+        </p:nvSpPr>
+        <p:spPr/>
+        <p:txBody>
+          <a:bodyPr>
+            <a:normAutofit/>
+          </a:bodyPr>
+          <a:lstStyle/>
+          <a:p>
             <a:endParaRPr lang="en-US"/>
           </a:p>
         </p:txBody>
@@ -4681,34 +4421,6 @@
       </p:sp>
       <p:sp>
         <p:nvSpPr>
-          <p:cNvPr id="3" name="Notes Placeholder 2"/>
-          <p:cNvSpPr>
-            <a:spLocks noGrp="1"/>
-          </p:cNvSpPr>
-          <p:nvPr>
-            <p:ph type="body" idx="1"/>
-          </p:nvPr>
-        </p:nvSpPr>
-        <p:spPr/>
-        <p:txBody>
-          <a:bodyPr>
-            <a:normAutofit/>
-          </a:bodyPr>
-          <a:lstStyle/>
-          <a:p>
-            <a:endParaRPr lang="en-US" sz="1200" kern="1200" dirty="0">
-              <a:solidFill>
-                <a:schemeClr val="tx1"/>
-              </a:solidFill>
-              <a:latin typeface="Arial" charset="0"/>
-              <a:ea typeface="+mn-ea"/>
-              <a:cs typeface="+mn-cs"/>
-            </a:endParaRPr>
-          </a:p>
-        </p:txBody>
-      </p:sp>
-      <p:sp>
-        <p:nvSpPr>
           <p:cNvPr id="4" name="Slide Number Placeholder 3"/>
           <p:cNvSpPr>
             <a:spLocks noGrp="1"/>
@@ -4727,6 +4439,27 @@
               <a:pPr/>
               <a:t>45</a:t>
             </a:fld>
+            <a:endParaRPr lang="en-US"/>
+          </a:p>
+        </p:txBody>
+      </p:sp>
+      <p:sp>
+        <p:nvSpPr>
+          <p:cNvPr id="5" name="Notes Placeholder 4"/>
+          <p:cNvSpPr>
+            <a:spLocks noGrp="1"/>
+          </p:cNvSpPr>
+          <p:nvPr>
+            <p:ph type="body" sz="quarter" idx="11"/>
+          </p:nvPr>
+        </p:nvSpPr>
+        <p:spPr/>
+        <p:txBody>
+          <a:bodyPr>
+            <a:normAutofit/>
+          </a:bodyPr>
+          <a:lstStyle/>
+          <a:p>
             <a:endParaRPr lang="en-US"/>
           </a:p>
         </p:txBody>
@@ -4775,47 +4508,6 @@
       </p:sp>
       <p:sp>
         <p:nvSpPr>
-          <p:cNvPr id="3" name="Notes Placeholder 2"/>
-          <p:cNvSpPr>
-            <a:spLocks noGrp="1"/>
-          </p:cNvSpPr>
-          <p:nvPr>
-            <p:ph type="body" idx="1"/>
-          </p:nvPr>
-        </p:nvSpPr>
-        <p:spPr/>
-        <p:txBody>
-          <a:bodyPr>
-            <a:normAutofit/>
-          </a:bodyPr>
-          <a:lstStyle/>
-          <a:p>
-            <a:pPr marL="0" marR="0" indent="0" algn="l" defTabSz="914400" rtl="0" eaLnBrk="1" fontAlgn="base" latinLnBrk="0" hangingPunct="1">
-              <a:lnSpc>
-                <a:spcPct val="100000"/>
-              </a:lnSpc>
-              <a:spcBef>
-                <a:spcPct val="30000"/>
-              </a:spcBef>
-              <a:spcAft>
-                <a:spcPct val="0"/>
-              </a:spcAft>
-              <a:buClrTx/>
-              <a:buSzTx/>
-              <a:buFontTx/>
-              <a:buNone/>
-              <a:tabLst/>
-              <a:defRPr/>
-            </a:pPr>
-            <a:endParaRPr lang="en-US" dirty="0" smtClean="0"/>
-          </a:p>
-          <a:p>
-            <a:endParaRPr lang="en-US" dirty="0"/>
-          </a:p>
-        </p:txBody>
-      </p:sp>
-      <p:sp>
-        <p:nvSpPr>
           <p:cNvPr id="4" name="Slide Number Placeholder 3"/>
           <p:cNvSpPr>
             <a:spLocks noGrp="1"/>
@@ -4834,6 +4526,27 @@
               <a:pPr/>
               <a:t>46</a:t>
             </a:fld>
+            <a:endParaRPr lang="en-US"/>
+          </a:p>
+        </p:txBody>
+      </p:sp>
+      <p:sp>
+        <p:nvSpPr>
+          <p:cNvPr id="5" name="Notes Placeholder 4"/>
+          <p:cNvSpPr>
+            <a:spLocks noGrp="1"/>
+          </p:cNvSpPr>
+          <p:nvPr>
+            <p:ph type="body" sz="quarter" idx="11"/>
+          </p:nvPr>
+        </p:nvSpPr>
+        <p:spPr/>
+        <p:txBody>
+          <a:bodyPr>
+            <a:normAutofit/>
+          </a:bodyPr>
+          <a:lstStyle/>
+          <a:p>
             <a:endParaRPr lang="en-US"/>
           </a:p>
         </p:txBody>
@@ -4882,36 +4595,6 @@
       </p:sp>
       <p:sp>
         <p:nvSpPr>
-          <p:cNvPr id="3" name="Notes Placeholder 2"/>
-          <p:cNvSpPr>
-            <a:spLocks noGrp="1"/>
-          </p:cNvSpPr>
-          <p:nvPr>
-            <p:ph type="body" idx="1"/>
-          </p:nvPr>
-        </p:nvSpPr>
-        <p:spPr/>
-        <p:txBody>
-          <a:bodyPr>
-            <a:normAutofit/>
-          </a:bodyPr>
-          <a:lstStyle/>
-          <a:p>
-            <a:endParaRPr lang="en-US" baseline="0" dirty="0" smtClean="0"/>
-          </a:p>
-          <a:p>
-            <a:endParaRPr lang="en-US" baseline="0" dirty="0" smtClean="0"/>
-          </a:p>
-          <a:p>
-            <a:endParaRPr lang="en-US" baseline="0" dirty="0" smtClean="0"/>
-          </a:p>
-          <a:p>
-            <a:endParaRPr lang="en-US" dirty="0"/>
-          </a:p>
-        </p:txBody>
-      </p:sp>
-      <p:sp>
-        <p:nvSpPr>
           <p:cNvPr id="4" name="Slide Number Placeholder 3"/>
           <p:cNvSpPr>
             <a:spLocks noGrp="1"/>
@@ -4930,6 +4613,27 @@
               <a:pPr/>
               <a:t>47</a:t>
             </a:fld>
+            <a:endParaRPr lang="en-US"/>
+          </a:p>
+        </p:txBody>
+      </p:sp>
+      <p:sp>
+        <p:nvSpPr>
+          <p:cNvPr id="5" name="Notes Placeholder 4"/>
+          <p:cNvSpPr>
+            <a:spLocks noGrp="1"/>
+          </p:cNvSpPr>
+          <p:nvPr>
+            <p:ph type="body" sz="quarter" idx="11"/>
+          </p:nvPr>
+        </p:nvSpPr>
+        <p:spPr/>
+        <p:txBody>
+          <a:bodyPr>
+            <a:normAutofit/>
+          </a:bodyPr>
+          <a:lstStyle/>
+          <a:p>
             <a:endParaRPr lang="en-US"/>
           </a:p>
         </p:txBody>
@@ -4978,27 +4682,6 @@
       </p:sp>
       <p:sp>
         <p:nvSpPr>
-          <p:cNvPr id="3" name="Notes Placeholder 2"/>
-          <p:cNvSpPr>
-            <a:spLocks noGrp="1"/>
-          </p:cNvSpPr>
-          <p:nvPr>
-            <p:ph type="body" idx="1"/>
-          </p:nvPr>
-        </p:nvSpPr>
-        <p:spPr/>
-        <p:txBody>
-          <a:bodyPr>
-            <a:normAutofit/>
-          </a:bodyPr>
-          <a:lstStyle/>
-          <a:p>
-            <a:endParaRPr lang="en-US" dirty="0"/>
-          </a:p>
-        </p:txBody>
-      </p:sp>
-      <p:sp>
-        <p:nvSpPr>
           <p:cNvPr id="4" name="Slide Number Placeholder 3"/>
           <p:cNvSpPr>
             <a:spLocks noGrp="1"/>
@@ -5017,6 +4700,27 @@
               <a:pPr/>
               <a:t>48</a:t>
             </a:fld>
+            <a:endParaRPr lang="en-US"/>
+          </a:p>
+        </p:txBody>
+      </p:sp>
+      <p:sp>
+        <p:nvSpPr>
+          <p:cNvPr id="5" name="Notes Placeholder 4"/>
+          <p:cNvSpPr>
+            <a:spLocks noGrp="1"/>
+          </p:cNvSpPr>
+          <p:nvPr>
+            <p:ph type="body" sz="quarter" idx="11"/>
+          </p:nvPr>
+        </p:nvSpPr>
+        <p:spPr/>
+        <p:txBody>
+          <a:bodyPr>
+            <a:normAutofit/>
+          </a:bodyPr>
+          <a:lstStyle/>
+          <a:p>
             <a:endParaRPr lang="en-US"/>
           </a:p>
         </p:txBody>
@@ -5065,27 +4769,6 @@
       </p:sp>
       <p:sp>
         <p:nvSpPr>
-          <p:cNvPr id="3" name="Notes Placeholder 2"/>
-          <p:cNvSpPr>
-            <a:spLocks noGrp="1"/>
-          </p:cNvSpPr>
-          <p:nvPr>
-            <p:ph type="body" idx="1"/>
-          </p:nvPr>
-        </p:nvSpPr>
-        <p:spPr/>
-        <p:txBody>
-          <a:bodyPr>
-            <a:normAutofit/>
-          </a:bodyPr>
-          <a:lstStyle/>
-          <a:p>
-            <a:endParaRPr lang="en-US" dirty="0"/>
-          </a:p>
-        </p:txBody>
-      </p:sp>
-      <p:sp>
-        <p:nvSpPr>
           <p:cNvPr id="4" name="Slide Number Placeholder 3"/>
           <p:cNvSpPr>
             <a:spLocks noGrp="1"/>
@@ -5104,6 +4787,27 @@
               <a:pPr/>
               <a:t>49</a:t>
             </a:fld>
+            <a:endParaRPr lang="en-US"/>
+          </a:p>
+        </p:txBody>
+      </p:sp>
+      <p:sp>
+        <p:nvSpPr>
+          <p:cNvPr id="5" name="Notes Placeholder 4"/>
+          <p:cNvSpPr>
+            <a:spLocks noGrp="1"/>
+          </p:cNvSpPr>
+          <p:nvPr>
+            <p:ph type="body" sz="quarter" idx="11"/>
+          </p:nvPr>
+        </p:nvSpPr>
+        <p:spPr/>
+        <p:txBody>
+          <a:bodyPr>
+            <a:normAutofit/>
+          </a:bodyPr>
+          <a:lstStyle/>
+          <a:p>
             <a:endParaRPr lang="en-US"/>
           </a:p>
         </p:txBody>
@@ -5152,30 +4856,6 @@
       </p:sp>
       <p:sp>
         <p:nvSpPr>
-          <p:cNvPr id="3" name="Notes Placeholder 2"/>
-          <p:cNvSpPr>
-            <a:spLocks noGrp="1"/>
-          </p:cNvSpPr>
-          <p:nvPr>
-            <p:ph type="body" idx="1"/>
-          </p:nvPr>
-        </p:nvSpPr>
-        <p:spPr/>
-        <p:txBody>
-          <a:bodyPr>
-            <a:normAutofit/>
-          </a:bodyPr>
-          <a:lstStyle/>
-          <a:p>
-            <a:endParaRPr lang="en-CA" dirty="0" smtClean="0"/>
-          </a:p>
-          <a:p>
-            <a:endParaRPr lang="en-US" dirty="0" err="1" smtClean="0"/>
-          </a:p>
-        </p:txBody>
-      </p:sp>
-      <p:sp>
-        <p:nvSpPr>
           <p:cNvPr id="4" name="Slide Number Placeholder 3"/>
           <p:cNvSpPr>
             <a:spLocks noGrp="1"/>
@@ -5194,6 +4874,27 @@
               <a:pPr/>
               <a:t>5</a:t>
             </a:fld>
+            <a:endParaRPr lang="en-US"/>
+          </a:p>
+        </p:txBody>
+      </p:sp>
+      <p:sp>
+        <p:nvSpPr>
+          <p:cNvPr id="5" name="Notes Placeholder 4"/>
+          <p:cNvSpPr>
+            <a:spLocks noGrp="1"/>
+          </p:cNvSpPr>
+          <p:nvPr>
+            <p:ph type="body" sz="quarter" idx="11"/>
+          </p:nvPr>
+        </p:nvSpPr>
+        <p:spPr/>
+        <p:txBody>
+          <a:bodyPr>
+            <a:normAutofit/>
+          </a:bodyPr>
+          <a:lstStyle/>
+          <a:p>
             <a:endParaRPr lang="en-US"/>
           </a:p>
         </p:txBody>
@@ -5416,27 +5117,6 @@
       </p:sp>
       <p:sp>
         <p:nvSpPr>
-          <p:cNvPr id="3" name="Notes Placeholder 2"/>
-          <p:cNvSpPr>
-            <a:spLocks noGrp="1"/>
-          </p:cNvSpPr>
-          <p:nvPr>
-            <p:ph type="body" idx="1"/>
-          </p:nvPr>
-        </p:nvSpPr>
-        <p:spPr/>
-        <p:txBody>
-          <a:bodyPr>
-            <a:normAutofit/>
-          </a:bodyPr>
-          <a:lstStyle/>
-          <a:p>
-            <a:endParaRPr lang="en-US" dirty="0"/>
-          </a:p>
-        </p:txBody>
-      </p:sp>
-      <p:sp>
-        <p:nvSpPr>
           <p:cNvPr id="4" name="Slide Number Placeholder 3"/>
           <p:cNvSpPr>
             <a:spLocks noGrp="1"/>
@@ -5455,6 +5135,27 @@
               <a:pPr/>
               <a:t>6</a:t>
             </a:fld>
+            <a:endParaRPr lang="en-US"/>
+          </a:p>
+        </p:txBody>
+      </p:sp>
+      <p:sp>
+        <p:nvSpPr>
+          <p:cNvPr id="5" name="Notes Placeholder 4"/>
+          <p:cNvSpPr>
+            <a:spLocks noGrp="1"/>
+          </p:cNvSpPr>
+          <p:nvPr>
+            <p:ph type="body" sz="quarter" idx="11"/>
+          </p:nvPr>
+        </p:nvSpPr>
+        <p:spPr/>
+        <p:txBody>
+          <a:bodyPr>
+            <a:normAutofit/>
+          </a:bodyPr>
+          <a:lstStyle/>
+          <a:p>
             <a:endParaRPr lang="en-US"/>
           </a:p>
         </p:txBody>
@@ -5504,30 +5205,6 @@
       </p:sp>
       <p:sp>
         <p:nvSpPr>
-          <p:cNvPr id="87043" name="Notes Placeholder 2"/>
-          <p:cNvSpPr>
-            <a:spLocks noGrp="1"/>
-          </p:cNvSpPr>
-          <p:nvPr>
-            <p:ph type="body" idx="1"/>
-          </p:nvPr>
-        </p:nvSpPr>
-        <p:spPr>
-          <a:noFill/>
-          <a:ln/>
-        </p:spPr>
-        <p:txBody>
-          <a:bodyPr/>
-          <a:lstStyle/>
-          <a:p>
-            <a:endParaRPr lang="en-US" dirty="0" smtClean="0">
-              <a:latin typeface="Arial" charset="0"/>
-            </a:endParaRPr>
-          </a:p>
-        </p:txBody>
-      </p:sp>
-      <p:sp>
-        <p:nvSpPr>
           <p:cNvPr id="87044" name="Slide Number Placeholder 3"/>
           <p:cNvSpPr>
             <a:spLocks noGrp="1"/>
@@ -5578,6 +5255,27 @@
               <a:ea typeface="+mn-ea"/>
               <a:cs typeface="+mn-cs"/>
             </a:endParaRPr>
+          </a:p>
+        </p:txBody>
+      </p:sp>
+      <p:sp>
+        <p:nvSpPr>
+          <p:cNvPr id="5" name="Notes Placeholder 4"/>
+          <p:cNvSpPr>
+            <a:spLocks noGrp="1"/>
+          </p:cNvSpPr>
+          <p:nvPr>
+            <p:ph type="body" sz="quarter" idx="10"/>
+          </p:nvPr>
+        </p:nvSpPr>
+        <p:spPr/>
+        <p:txBody>
+          <a:bodyPr>
+            <a:normAutofit/>
+          </a:bodyPr>
+          <a:lstStyle/>
+          <a:p>
+            <a:endParaRPr lang="en-US"/>
           </a:p>
         </p:txBody>
       </p:sp>
@@ -5625,36 +5323,6 @@
       </p:sp>
       <p:sp>
         <p:nvSpPr>
-          <p:cNvPr id="3" name="Notes Placeholder 2"/>
-          <p:cNvSpPr>
-            <a:spLocks noGrp="1"/>
-          </p:cNvSpPr>
-          <p:nvPr>
-            <p:ph type="body" idx="1"/>
-          </p:nvPr>
-        </p:nvSpPr>
-        <p:spPr/>
-        <p:txBody>
-          <a:bodyPr>
-            <a:normAutofit/>
-          </a:bodyPr>
-          <a:lstStyle/>
-          <a:p>
-            <a:endParaRPr lang="en-US" baseline="0" dirty="0" smtClean="0"/>
-          </a:p>
-          <a:p>
-            <a:endParaRPr lang="en-US" baseline="0" dirty="0" smtClean="0"/>
-          </a:p>
-          <a:p>
-            <a:endParaRPr lang="en-US" baseline="0" dirty="0" smtClean="0"/>
-          </a:p>
-          <a:p>
-            <a:endParaRPr lang="en-US" baseline="0" dirty="0" smtClean="0"/>
-          </a:p>
-        </p:txBody>
-      </p:sp>
-      <p:sp>
-        <p:nvSpPr>
           <p:cNvPr id="4" name="Slide Number Placeholder 3"/>
           <p:cNvSpPr>
             <a:spLocks noGrp="1"/>
@@ -5673,6 +5341,27 @@
               <a:pPr/>
               <a:t>8</a:t>
             </a:fld>
+            <a:endParaRPr lang="en-US"/>
+          </a:p>
+        </p:txBody>
+      </p:sp>
+      <p:sp>
+        <p:nvSpPr>
+          <p:cNvPr id="5" name="Notes Placeholder 4"/>
+          <p:cNvSpPr>
+            <a:spLocks noGrp="1"/>
+          </p:cNvSpPr>
+          <p:nvPr>
+            <p:ph type="body" sz="quarter" idx="11"/>
+          </p:nvPr>
+        </p:nvSpPr>
+        <p:spPr/>
+        <p:txBody>
+          <a:bodyPr>
+            <a:normAutofit/>
+          </a:bodyPr>
+          <a:lstStyle/>
+          <a:p>
             <a:endParaRPr lang="en-US"/>
           </a:p>
         </p:txBody>
@@ -5722,30 +5411,6 @@
       </p:sp>
       <p:sp>
         <p:nvSpPr>
-          <p:cNvPr id="88067" name="Notes Placeholder 2"/>
-          <p:cNvSpPr>
-            <a:spLocks noGrp="1"/>
-          </p:cNvSpPr>
-          <p:nvPr>
-            <p:ph type="body" idx="1"/>
-          </p:nvPr>
-        </p:nvSpPr>
-        <p:spPr>
-          <a:noFill/>
-          <a:ln/>
-        </p:spPr>
-        <p:txBody>
-          <a:bodyPr/>
-          <a:lstStyle/>
-          <a:p>
-            <a:endParaRPr lang="en-US" smtClean="0">
-              <a:latin typeface="Arial" charset="0"/>
-            </a:endParaRPr>
-          </a:p>
-        </p:txBody>
-      </p:sp>
-      <p:sp>
-        <p:nvSpPr>
           <p:cNvPr id="88068" name="Slide Number Placeholder 3"/>
           <p:cNvSpPr>
             <a:spLocks noGrp="1"/>
@@ -5796,6 +5461,27 @@
               <a:ea typeface="+mn-ea"/>
               <a:cs typeface="+mn-cs"/>
             </a:endParaRPr>
+          </a:p>
+        </p:txBody>
+      </p:sp>
+      <p:sp>
+        <p:nvSpPr>
+          <p:cNvPr id="5" name="Notes Placeholder 4"/>
+          <p:cNvSpPr>
+            <a:spLocks noGrp="1"/>
+          </p:cNvSpPr>
+          <p:nvPr>
+            <p:ph type="body" sz="quarter" idx="10"/>
+          </p:nvPr>
+        </p:nvSpPr>
+        <p:spPr/>
+        <p:txBody>
+          <a:bodyPr>
+            <a:normAutofit/>
+          </a:bodyPr>
+          <a:lstStyle/>
+          <a:p>
+            <a:endParaRPr lang="en-US"/>
           </a:p>
         </p:txBody>
       </p:sp>

</xml_diff>